<commit_message>
adding instructions on jlcpcb
</commit_message>
<xml_diff>
--- a/PCB/schematics-v17-safety-jlcpcb/readme-media/home-connections.pptx
+++ b/PCB/schematics-v17-safety-jlcpcb/readme-media/home-connections.pptx
@@ -104,6 +104,11 @@
       </a:defRPr>
     </a:lvl9pPr>
   </p:defaultTextStyle>
+  <p:extLst>
+    <p:ext uri="{EFAFB233-063F-42B5-8137-9DF3F51BA10A}">
+      <p15:sldGuideLst xmlns:p15="http://schemas.microsoft.com/office/powerpoint/2012/main"/>
+    </p:ext>
+  </p:extLst>
 </p:presentation>
 </file>
 
@@ -256,7 +261,7 @@
           <a:p>
             <a:fld id="{26A2C88A-BAEE-46D6-8568-B2FDD65BE323}" type="datetimeFigureOut">
               <a:rPr lang="en-CH" smtClean="0"/>
-              <a:t>15/01/2022</a:t>
+              <a:t>30/05/2022</a:t>
             </a:fld>
             <a:endParaRPr lang="en-CH"/>
           </a:p>
@@ -456,7 +461,7 @@
           <a:p>
             <a:fld id="{26A2C88A-BAEE-46D6-8568-B2FDD65BE323}" type="datetimeFigureOut">
               <a:rPr lang="en-CH" smtClean="0"/>
-              <a:t>15/01/2022</a:t>
+              <a:t>30/05/2022</a:t>
             </a:fld>
             <a:endParaRPr lang="en-CH"/>
           </a:p>
@@ -666,7 +671,7 @@
           <a:p>
             <a:fld id="{26A2C88A-BAEE-46D6-8568-B2FDD65BE323}" type="datetimeFigureOut">
               <a:rPr lang="en-CH" smtClean="0"/>
-              <a:t>15/01/2022</a:t>
+              <a:t>30/05/2022</a:t>
             </a:fld>
             <a:endParaRPr lang="en-CH"/>
           </a:p>
@@ -866,7 +871,7 @@
           <a:p>
             <a:fld id="{26A2C88A-BAEE-46D6-8568-B2FDD65BE323}" type="datetimeFigureOut">
               <a:rPr lang="en-CH" smtClean="0"/>
-              <a:t>15/01/2022</a:t>
+              <a:t>30/05/2022</a:t>
             </a:fld>
             <a:endParaRPr lang="en-CH"/>
           </a:p>
@@ -1142,7 +1147,7 @@
           <a:p>
             <a:fld id="{26A2C88A-BAEE-46D6-8568-B2FDD65BE323}" type="datetimeFigureOut">
               <a:rPr lang="en-CH" smtClean="0"/>
-              <a:t>15/01/2022</a:t>
+              <a:t>30/05/2022</a:t>
             </a:fld>
             <a:endParaRPr lang="en-CH"/>
           </a:p>
@@ -1410,7 +1415,7 @@
           <a:p>
             <a:fld id="{26A2C88A-BAEE-46D6-8568-B2FDD65BE323}" type="datetimeFigureOut">
               <a:rPr lang="en-CH" smtClean="0"/>
-              <a:t>15/01/2022</a:t>
+              <a:t>30/05/2022</a:t>
             </a:fld>
             <a:endParaRPr lang="en-CH"/>
           </a:p>
@@ -1825,7 +1830,7 @@
           <a:p>
             <a:fld id="{26A2C88A-BAEE-46D6-8568-B2FDD65BE323}" type="datetimeFigureOut">
               <a:rPr lang="en-CH" smtClean="0"/>
-              <a:t>15/01/2022</a:t>
+              <a:t>30/05/2022</a:t>
             </a:fld>
             <a:endParaRPr lang="en-CH"/>
           </a:p>
@@ -1967,7 +1972,7 @@
           <a:p>
             <a:fld id="{26A2C88A-BAEE-46D6-8568-B2FDD65BE323}" type="datetimeFigureOut">
               <a:rPr lang="en-CH" smtClean="0"/>
-              <a:t>15/01/2022</a:t>
+              <a:t>30/05/2022</a:t>
             </a:fld>
             <a:endParaRPr lang="en-CH"/>
           </a:p>
@@ -2080,7 +2085,7 @@
           <a:p>
             <a:fld id="{26A2C88A-BAEE-46D6-8568-B2FDD65BE323}" type="datetimeFigureOut">
               <a:rPr lang="en-CH" smtClean="0"/>
-              <a:t>15/01/2022</a:t>
+              <a:t>30/05/2022</a:t>
             </a:fld>
             <a:endParaRPr lang="en-CH"/>
           </a:p>
@@ -2393,7 +2398,7 @@
           <a:p>
             <a:fld id="{26A2C88A-BAEE-46D6-8568-B2FDD65BE323}" type="datetimeFigureOut">
               <a:rPr lang="en-CH" smtClean="0"/>
-              <a:t>15/01/2022</a:t>
+              <a:t>30/05/2022</a:t>
             </a:fld>
             <a:endParaRPr lang="en-CH"/>
           </a:p>
@@ -2682,7 +2687,7 @@
           <a:p>
             <a:fld id="{26A2C88A-BAEE-46D6-8568-B2FDD65BE323}" type="datetimeFigureOut">
               <a:rPr lang="en-CH" smtClean="0"/>
-              <a:t>15/01/2022</a:t>
+              <a:t>30/05/2022</a:t>
             </a:fld>
             <a:endParaRPr lang="en-CH"/>
           </a:p>
@@ -2925,7 +2930,7 @@
           <a:p>
             <a:fld id="{26A2C88A-BAEE-46D6-8568-B2FDD65BE323}" type="datetimeFigureOut">
               <a:rPr lang="en-CH" smtClean="0"/>
-              <a:t>15/01/2022</a:t>
+              <a:t>30/05/2022</a:t>
             </a:fld>
             <a:endParaRPr lang="en-CH"/>
           </a:p>
@@ -3342,6 +3347,42 @@
           <a:chExt cx="0" cy="0"/>
         </a:xfrm>
       </p:grpSpPr>
+      <p:pic>
+        <p:nvPicPr>
+          <p:cNvPr id="3" name="Picture 2" descr="A screenshot of a computer&#10;&#10;Description automatically generated with medium confidence">
+            <a:extLst>
+              <a:ext uri="{FF2B5EF4-FFF2-40B4-BE49-F238E27FC236}">
+                <a16:creationId xmlns:a16="http://schemas.microsoft.com/office/drawing/2014/main" id="{1E80AA60-3983-094F-FAB4-74E3A6090141}"/>
+              </a:ext>
+            </a:extLst>
+          </p:cNvPr>
+          <p:cNvPicPr>
+            <a:picLocks noChangeAspect="1"/>
+          </p:cNvPicPr>
+          <p:nvPr/>
+        </p:nvPicPr>
+        <p:blipFill>
+          <a:blip r:embed="rId2">
+            <a:extLst>
+              <a:ext uri="{28A0092B-C50C-407E-A947-70E740481C1C}">
+                <a14:useLocalDpi xmlns:a14="http://schemas.microsoft.com/office/drawing/2010/main" val="0"/>
+              </a:ext>
+            </a:extLst>
+          </a:blip>
+          <a:stretch>
+            <a:fillRect/>
+          </a:stretch>
+        </p:blipFill>
+        <p:spPr>
+          <a:xfrm>
+            <a:off x="2038885" y="1896022"/>
+            <a:ext cx="2153465" cy="2287084"/>
+          </a:xfrm>
+          <a:prstGeom prst="rect">
+            <a:avLst/>
+          </a:prstGeom>
+        </p:spPr>
+      </p:pic>
       <p:cxnSp>
         <p:nvCxnSpPr>
           <p:cNvPr id="58" name="Straight Connector 57">
@@ -3435,11 +3476,11 @@
           <p:nvPr/>
         </p:nvPicPr>
         <p:blipFill>
-          <a:blip r:embed="rId2">
+          <a:blip r:embed="rId3">
             <a:extLst>
               <a:ext uri="{BEBA8EAE-BF5A-486C-A8C5-ECC9F3942E4B}">
                 <a14:imgProps xmlns:a14="http://schemas.microsoft.com/office/drawing/2010/main">
-                  <a14:imgLayer r:embed="rId3">
+                  <a14:imgLayer r:embed="rId4">
                     <a14:imgEffect>
                       <a14:backgroundRemoval t="4167" b="97619" l="10000" r="90000">
                         <a14:foregroundMark x1="73333" y1="84524" x2="43667" y2="91667"/>
@@ -3508,7 +3549,7 @@
           <p:nvPr/>
         </p:nvPicPr>
         <p:blipFill>
-          <a:blip r:embed="rId4"/>
+          <a:blip r:embed="rId5"/>
           <a:stretch>
             <a:fillRect/>
           </a:stretch>
@@ -3538,7 +3579,7 @@
           <p:nvPr/>
         </p:nvPicPr>
         <p:blipFill>
-          <a:blip r:embed="rId5">
+          <a:blip r:embed="rId6">
             <a:extLst>
               <a:ext uri="{28A0092B-C50C-407E-A947-70E740481C1C}">
                 <a14:useLocalDpi xmlns:a14="http://schemas.microsoft.com/office/drawing/2010/main" val="0"/>
@@ -3570,36 +3611,6 @@
           </a:extLst>
         </p:spPr>
       </p:pic>
-      <p:pic>
-        <p:nvPicPr>
-          <p:cNvPr id="6" name="Picture 5">
-            <a:extLst>
-              <a:ext uri="{FF2B5EF4-FFF2-40B4-BE49-F238E27FC236}">
-                <a16:creationId xmlns:a16="http://schemas.microsoft.com/office/drawing/2014/main" id="{0C44DCAF-8213-4E2D-B577-BB7DF22D1EAF}"/>
-              </a:ext>
-            </a:extLst>
-          </p:cNvPr>
-          <p:cNvPicPr>
-            <a:picLocks noChangeAspect="1"/>
-          </p:cNvPicPr>
-          <p:nvPr/>
-        </p:nvPicPr>
-        <p:blipFill>
-          <a:blip r:embed="rId6"/>
-          <a:stretch>
-            <a:fillRect/>
-          </a:stretch>
-        </p:blipFill>
-        <p:spPr>
-          <a:xfrm>
-            <a:off x="2204592" y="1828800"/>
-            <a:ext cx="1881016" cy="2041182"/>
-          </a:xfrm>
-          <a:prstGeom prst="rect">
-            <a:avLst/>
-          </a:prstGeom>
-        </p:spPr>
-      </p:pic>
       <p:cxnSp>
         <p:nvCxnSpPr>
           <p:cNvPr id="8" name="Straight Connector 7">
@@ -3771,9 +3782,9 @@
           <p:nvPr/>
         </p:nvCxnSpPr>
         <p:spPr>
-          <a:xfrm flipH="1">
-            <a:off x="3353945" y="1456661"/>
-            <a:ext cx="2349795" cy="0"/>
+          <a:xfrm flipH="1" flipV="1">
+            <a:off x="3223532" y="1450144"/>
+            <a:ext cx="2480208" cy="6517"/>
           </a:xfrm>
           <a:prstGeom prst="line">
             <a:avLst/>
@@ -3854,8 +3865,8 @@
         </p:nvCxnSpPr>
         <p:spPr>
           <a:xfrm>
-            <a:off x="3353945" y="1456661"/>
-            <a:ext cx="0" cy="571993"/>
+            <a:off x="3234202" y="1442810"/>
+            <a:ext cx="0" cy="600445"/>
           </a:xfrm>
           <a:prstGeom prst="line">
             <a:avLst/>
@@ -3897,8 +3908,8 @@
         </p:nvCxnSpPr>
         <p:spPr>
           <a:xfrm>
-            <a:off x="3871016" y="1611086"/>
-            <a:ext cx="0" cy="417567"/>
+            <a:off x="3871016" y="1597479"/>
+            <a:ext cx="0" cy="431174"/>
           </a:xfrm>
           <a:prstGeom prst="line">
             <a:avLst/>
@@ -4068,11 +4079,11 @@
           <p:nvPr/>
         </p:nvPicPr>
         <p:blipFill>
-          <a:blip r:embed="rId2">
+          <a:blip r:embed="rId3">
             <a:extLst>
               <a:ext uri="{BEBA8EAE-BF5A-486C-A8C5-ECC9F3942E4B}">
                 <a14:imgProps xmlns:a14="http://schemas.microsoft.com/office/drawing/2010/main">
-                  <a14:imgLayer r:embed="rId3">
+                  <a14:imgLayer r:embed="rId4">
                     <a14:imgEffect>
                       <a14:backgroundRemoval t="4167" b="97619" l="10000" r="90000">
                         <a14:foregroundMark x1="73333" y1="84524" x2="43667" y2="91667"/>
@@ -4141,11 +4152,11 @@
           <p:nvPr/>
         </p:nvPicPr>
         <p:blipFill>
-          <a:blip r:embed="rId2">
+          <a:blip r:embed="rId3">
             <a:extLst>
               <a:ext uri="{BEBA8EAE-BF5A-486C-A8C5-ECC9F3942E4B}">
                 <a14:imgProps xmlns:a14="http://schemas.microsoft.com/office/drawing/2010/main">
-                  <a14:imgLayer r:embed="rId3">
+                  <a14:imgLayer r:embed="rId4">
                     <a14:imgEffect>
                       <a14:backgroundRemoval t="4167" b="97619" l="10000" r="90000">
                         <a14:foregroundMark x1="73333" y1="84524" x2="43667" y2="91667"/>
@@ -4310,6 +4321,522 @@
           </a:p>
         </p:txBody>
       </p:sp>
+      <p:cxnSp>
+        <p:nvCxnSpPr>
+          <p:cNvPr id="11" name="Straight Connector 10">
+            <a:extLst>
+              <a:ext uri="{FF2B5EF4-FFF2-40B4-BE49-F238E27FC236}">
+                <a16:creationId xmlns:a16="http://schemas.microsoft.com/office/drawing/2014/main" id="{D6EF5FA0-6E93-240A-A905-839ABB7D86B2}"/>
+              </a:ext>
+            </a:extLst>
+          </p:cNvPr>
+          <p:cNvCxnSpPr>
+            <a:cxnSpLocks/>
+          </p:cNvCxnSpPr>
+          <p:nvPr/>
+        </p:nvCxnSpPr>
+        <p:spPr>
+          <a:xfrm>
+            <a:off x="3105876" y="1502229"/>
+            <a:ext cx="0" cy="541026"/>
+          </a:xfrm>
+          <a:prstGeom prst="line">
+            <a:avLst/>
+          </a:prstGeom>
+          <a:ln w="28575">
+            <a:solidFill>
+              <a:srgbClr val="FF0000"/>
+            </a:solidFill>
+          </a:ln>
+        </p:spPr>
+        <p:style>
+          <a:lnRef idx="3">
+            <a:schemeClr val="accent2"/>
+          </a:lnRef>
+          <a:fillRef idx="0">
+            <a:schemeClr val="accent2"/>
+          </a:fillRef>
+          <a:effectRef idx="2">
+            <a:schemeClr val="accent2"/>
+          </a:effectRef>
+          <a:fontRef idx="minor">
+            <a:schemeClr val="tx1"/>
+          </a:fontRef>
+        </p:style>
+      </p:cxnSp>
+      <p:cxnSp>
+        <p:nvCxnSpPr>
+          <p:cNvPr id="12" name="Straight Connector 11">
+            <a:extLst>
+              <a:ext uri="{FF2B5EF4-FFF2-40B4-BE49-F238E27FC236}">
+                <a16:creationId xmlns:a16="http://schemas.microsoft.com/office/drawing/2014/main" id="{8717ADCB-EF01-207F-7DA5-6561FF4E0064}"/>
+              </a:ext>
+            </a:extLst>
+          </p:cNvPr>
+          <p:cNvCxnSpPr>
+            <a:cxnSpLocks/>
+          </p:cNvCxnSpPr>
+          <p:nvPr/>
+        </p:nvCxnSpPr>
+        <p:spPr>
+          <a:xfrm>
+            <a:off x="2975666" y="1572986"/>
+            <a:ext cx="0" cy="470268"/>
+          </a:xfrm>
+          <a:prstGeom prst="line">
+            <a:avLst/>
+          </a:prstGeom>
+          <a:ln w="28575">
+            <a:solidFill>
+              <a:srgbClr val="FF0000"/>
+            </a:solidFill>
+          </a:ln>
+        </p:spPr>
+        <p:style>
+          <a:lnRef idx="3">
+            <a:schemeClr val="accent2"/>
+          </a:lnRef>
+          <a:fillRef idx="0">
+            <a:schemeClr val="accent2"/>
+          </a:fillRef>
+          <a:effectRef idx="2">
+            <a:schemeClr val="accent2"/>
+          </a:effectRef>
+          <a:fontRef idx="minor">
+            <a:schemeClr val="tx1"/>
+          </a:fontRef>
+        </p:style>
+      </p:cxnSp>
+      <p:cxnSp>
+        <p:nvCxnSpPr>
+          <p:cNvPr id="14" name="Straight Connector 13">
+            <a:extLst>
+              <a:ext uri="{FF2B5EF4-FFF2-40B4-BE49-F238E27FC236}">
+                <a16:creationId xmlns:a16="http://schemas.microsoft.com/office/drawing/2014/main" id="{19856940-CF3F-54DA-E40A-E34BB806E353}"/>
+              </a:ext>
+            </a:extLst>
+          </p:cNvPr>
+          <p:cNvCxnSpPr>
+            <a:cxnSpLocks/>
+          </p:cNvCxnSpPr>
+          <p:nvPr/>
+        </p:nvCxnSpPr>
+        <p:spPr>
+          <a:xfrm>
+            <a:off x="2850480" y="1641021"/>
+            <a:ext cx="0" cy="402232"/>
+          </a:xfrm>
+          <a:prstGeom prst="line">
+            <a:avLst/>
+          </a:prstGeom>
+          <a:ln w="28575">
+            <a:solidFill>
+              <a:srgbClr val="FF0000"/>
+            </a:solidFill>
+          </a:ln>
+        </p:spPr>
+        <p:style>
+          <a:lnRef idx="3">
+            <a:schemeClr val="accent2"/>
+          </a:lnRef>
+          <a:fillRef idx="0">
+            <a:schemeClr val="accent2"/>
+          </a:fillRef>
+          <a:effectRef idx="2">
+            <a:schemeClr val="accent2"/>
+          </a:effectRef>
+          <a:fontRef idx="minor">
+            <a:schemeClr val="tx1"/>
+          </a:fontRef>
+        </p:style>
+      </p:cxnSp>
+      <p:cxnSp>
+        <p:nvCxnSpPr>
+          <p:cNvPr id="15" name="Straight Connector 14">
+            <a:extLst>
+              <a:ext uri="{FF2B5EF4-FFF2-40B4-BE49-F238E27FC236}">
+                <a16:creationId xmlns:a16="http://schemas.microsoft.com/office/drawing/2014/main" id="{E97AA70C-B633-92EB-3528-D8BF5B28D28B}"/>
+              </a:ext>
+            </a:extLst>
+          </p:cNvPr>
+          <p:cNvCxnSpPr>
+            <a:cxnSpLocks/>
+          </p:cNvCxnSpPr>
+          <p:nvPr/>
+        </p:nvCxnSpPr>
+        <p:spPr>
+          <a:xfrm flipH="1" flipV="1">
+            <a:off x="3110484" y="1513758"/>
+            <a:ext cx="71779" cy="1129"/>
+          </a:xfrm>
+          <a:prstGeom prst="line">
+            <a:avLst/>
+          </a:prstGeom>
+          <a:ln w="28575">
+            <a:solidFill>
+              <a:srgbClr val="FF0000"/>
+            </a:solidFill>
+          </a:ln>
+        </p:spPr>
+        <p:style>
+          <a:lnRef idx="3">
+            <a:schemeClr val="accent2"/>
+          </a:lnRef>
+          <a:fillRef idx="0">
+            <a:schemeClr val="accent2"/>
+          </a:fillRef>
+          <a:effectRef idx="2">
+            <a:schemeClr val="accent2"/>
+          </a:effectRef>
+          <a:fontRef idx="minor">
+            <a:schemeClr val="tx1"/>
+          </a:fontRef>
+        </p:style>
+      </p:cxnSp>
+      <p:cxnSp>
+        <p:nvCxnSpPr>
+          <p:cNvPr id="19" name="Straight Connector 18">
+            <a:extLst>
+              <a:ext uri="{FF2B5EF4-FFF2-40B4-BE49-F238E27FC236}">
+                <a16:creationId xmlns:a16="http://schemas.microsoft.com/office/drawing/2014/main" id="{05CC0D43-1BD6-6A8E-8F21-EB20479C62FE}"/>
+              </a:ext>
+            </a:extLst>
+          </p:cNvPr>
+          <p:cNvCxnSpPr>
+            <a:cxnSpLocks/>
+          </p:cNvCxnSpPr>
+          <p:nvPr/>
+        </p:nvCxnSpPr>
+        <p:spPr>
+          <a:xfrm flipH="1" flipV="1">
+            <a:off x="2971888" y="1587236"/>
+            <a:ext cx="71779" cy="1129"/>
+          </a:xfrm>
+          <a:prstGeom prst="line">
+            <a:avLst/>
+          </a:prstGeom>
+          <a:ln w="28575">
+            <a:solidFill>
+              <a:srgbClr val="FF0000"/>
+            </a:solidFill>
+          </a:ln>
+        </p:spPr>
+        <p:style>
+          <a:lnRef idx="3">
+            <a:schemeClr val="accent2"/>
+          </a:lnRef>
+          <a:fillRef idx="0">
+            <a:schemeClr val="accent2"/>
+          </a:fillRef>
+          <a:effectRef idx="2">
+            <a:schemeClr val="accent2"/>
+          </a:effectRef>
+          <a:fontRef idx="minor">
+            <a:schemeClr val="tx1"/>
+          </a:fontRef>
+        </p:style>
+      </p:cxnSp>
+      <p:cxnSp>
+        <p:nvCxnSpPr>
+          <p:cNvPr id="22" name="Straight Connector 21">
+            <a:extLst>
+              <a:ext uri="{FF2B5EF4-FFF2-40B4-BE49-F238E27FC236}">
+                <a16:creationId xmlns:a16="http://schemas.microsoft.com/office/drawing/2014/main" id="{14FF1A85-20BC-6734-5486-25D9AE5B3646}"/>
+              </a:ext>
+            </a:extLst>
+          </p:cNvPr>
+          <p:cNvCxnSpPr>
+            <a:cxnSpLocks/>
+          </p:cNvCxnSpPr>
+          <p:nvPr/>
+        </p:nvCxnSpPr>
+        <p:spPr>
+          <a:xfrm flipH="1" flipV="1">
+            <a:off x="2842172" y="1653940"/>
+            <a:ext cx="71779" cy="1129"/>
+          </a:xfrm>
+          <a:prstGeom prst="line">
+            <a:avLst/>
+          </a:prstGeom>
+          <a:ln w="28575">
+            <a:solidFill>
+              <a:srgbClr val="FF0000"/>
+            </a:solidFill>
+          </a:ln>
+        </p:spPr>
+        <p:style>
+          <a:lnRef idx="3">
+            <a:schemeClr val="accent2"/>
+          </a:lnRef>
+          <a:fillRef idx="0">
+            <a:schemeClr val="accent2"/>
+          </a:fillRef>
+          <a:effectRef idx="2">
+            <a:schemeClr val="accent2"/>
+          </a:effectRef>
+          <a:fontRef idx="minor">
+            <a:schemeClr val="tx1"/>
+          </a:fontRef>
+        </p:style>
+      </p:cxnSp>
+      <p:cxnSp>
+        <p:nvCxnSpPr>
+          <p:cNvPr id="32" name="Straight Connector 31">
+            <a:extLst>
+              <a:ext uri="{FF2B5EF4-FFF2-40B4-BE49-F238E27FC236}">
+                <a16:creationId xmlns:a16="http://schemas.microsoft.com/office/drawing/2014/main" id="{B09C4146-0CF7-5A48-6E59-D065435E44D9}"/>
+              </a:ext>
+            </a:extLst>
+          </p:cNvPr>
+          <p:cNvCxnSpPr>
+            <a:cxnSpLocks/>
+          </p:cNvCxnSpPr>
+          <p:nvPr/>
+        </p:nvCxnSpPr>
+        <p:spPr>
+          <a:xfrm>
+            <a:off x="3728141" y="1669596"/>
+            <a:ext cx="0" cy="359057"/>
+          </a:xfrm>
+          <a:prstGeom prst="line">
+            <a:avLst/>
+          </a:prstGeom>
+          <a:ln w="28575">
+            <a:solidFill>
+              <a:srgbClr val="7030A0"/>
+            </a:solidFill>
+          </a:ln>
+        </p:spPr>
+        <p:style>
+          <a:lnRef idx="3">
+            <a:schemeClr val="accent2"/>
+          </a:lnRef>
+          <a:fillRef idx="0">
+            <a:schemeClr val="accent2"/>
+          </a:fillRef>
+          <a:effectRef idx="2">
+            <a:schemeClr val="accent2"/>
+          </a:effectRef>
+          <a:fontRef idx="minor">
+            <a:schemeClr val="tx1"/>
+          </a:fontRef>
+        </p:style>
+      </p:cxnSp>
+      <p:cxnSp>
+        <p:nvCxnSpPr>
+          <p:cNvPr id="38" name="Straight Connector 37">
+            <a:extLst>
+              <a:ext uri="{FF2B5EF4-FFF2-40B4-BE49-F238E27FC236}">
+                <a16:creationId xmlns:a16="http://schemas.microsoft.com/office/drawing/2014/main" id="{75D5A128-5768-CD58-AF4D-B2535139CE38}"/>
+              </a:ext>
+            </a:extLst>
+          </p:cNvPr>
+          <p:cNvCxnSpPr>
+            <a:cxnSpLocks/>
+          </p:cNvCxnSpPr>
+          <p:nvPr/>
+        </p:nvCxnSpPr>
+        <p:spPr>
+          <a:xfrm>
+            <a:off x="3600234" y="1743032"/>
+            <a:ext cx="0" cy="292865"/>
+          </a:xfrm>
+          <a:prstGeom prst="line">
+            <a:avLst/>
+          </a:prstGeom>
+          <a:ln w="28575">
+            <a:solidFill>
+              <a:srgbClr val="7030A0"/>
+            </a:solidFill>
+          </a:ln>
+        </p:spPr>
+        <p:style>
+          <a:lnRef idx="3">
+            <a:schemeClr val="accent2"/>
+          </a:lnRef>
+          <a:fillRef idx="0">
+            <a:schemeClr val="accent2"/>
+          </a:fillRef>
+          <a:effectRef idx="2">
+            <a:schemeClr val="accent2"/>
+          </a:effectRef>
+          <a:fontRef idx="minor">
+            <a:schemeClr val="tx1"/>
+          </a:fontRef>
+        </p:style>
+      </p:cxnSp>
+      <p:cxnSp>
+        <p:nvCxnSpPr>
+          <p:cNvPr id="43" name="Straight Connector 42">
+            <a:extLst>
+              <a:ext uri="{FF2B5EF4-FFF2-40B4-BE49-F238E27FC236}">
+                <a16:creationId xmlns:a16="http://schemas.microsoft.com/office/drawing/2014/main" id="{397A3A14-E58F-B531-0DB5-D8C343EB509F}"/>
+              </a:ext>
+            </a:extLst>
+          </p:cNvPr>
+          <p:cNvCxnSpPr>
+            <a:cxnSpLocks/>
+          </p:cNvCxnSpPr>
+          <p:nvPr/>
+        </p:nvCxnSpPr>
+        <p:spPr>
+          <a:xfrm>
+            <a:off x="3472327" y="1808120"/>
+            <a:ext cx="0" cy="227777"/>
+          </a:xfrm>
+          <a:prstGeom prst="line">
+            <a:avLst/>
+          </a:prstGeom>
+          <a:ln w="28575">
+            <a:solidFill>
+              <a:srgbClr val="7030A0"/>
+            </a:solidFill>
+          </a:ln>
+        </p:spPr>
+        <p:style>
+          <a:lnRef idx="3">
+            <a:schemeClr val="accent2"/>
+          </a:lnRef>
+          <a:fillRef idx="0">
+            <a:schemeClr val="accent2"/>
+          </a:fillRef>
+          <a:effectRef idx="2">
+            <a:schemeClr val="accent2"/>
+          </a:effectRef>
+          <a:fontRef idx="minor">
+            <a:schemeClr val="tx1"/>
+          </a:fontRef>
+        </p:style>
+      </p:cxnSp>
+      <p:cxnSp>
+        <p:nvCxnSpPr>
+          <p:cNvPr id="46" name="Straight Connector 45">
+            <a:extLst>
+              <a:ext uri="{FF2B5EF4-FFF2-40B4-BE49-F238E27FC236}">
+                <a16:creationId xmlns:a16="http://schemas.microsoft.com/office/drawing/2014/main" id="{3C34AC08-381E-092B-BDD2-429E214221DB}"/>
+              </a:ext>
+            </a:extLst>
+          </p:cNvPr>
+          <p:cNvCxnSpPr>
+            <a:cxnSpLocks/>
+          </p:cNvCxnSpPr>
+          <p:nvPr/>
+        </p:nvCxnSpPr>
+        <p:spPr>
+          <a:xfrm flipH="1">
+            <a:off x="3717039" y="1676400"/>
+            <a:ext cx="107929" cy="0"/>
+          </a:xfrm>
+          <a:prstGeom prst="line">
+            <a:avLst/>
+          </a:prstGeom>
+          <a:ln w="28575">
+            <a:solidFill>
+              <a:srgbClr val="7030A0"/>
+            </a:solidFill>
+          </a:ln>
+        </p:spPr>
+        <p:style>
+          <a:lnRef idx="3">
+            <a:schemeClr val="accent2"/>
+          </a:lnRef>
+          <a:fillRef idx="0">
+            <a:schemeClr val="accent2"/>
+          </a:fillRef>
+          <a:effectRef idx="2">
+            <a:schemeClr val="accent2"/>
+          </a:effectRef>
+          <a:fontRef idx="minor">
+            <a:schemeClr val="tx1"/>
+          </a:fontRef>
+        </p:style>
+      </p:cxnSp>
+      <p:cxnSp>
+        <p:nvCxnSpPr>
+          <p:cNvPr id="48" name="Straight Connector 47">
+            <a:extLst>
+              <a:ext uri="{FF2B5EF4-FFF2-40B4-BE49-F238E27FC236}">
+                <a16:creationId xmlns:a16="http://schemas.microsoft.com/office/drawing/2014/main" id="{28058FE9-D316-2459-30EA-8419768B6241}"/>
+              </a:ext>
+            </a:extLst>
+          </p:cNvPr>
+          <p:cNvCxnSpPr>
+            <a:cxnSpLocks/>
+          </p:cNvCxnSpPr>
+          <p:nvPr/>
+        </p:nvCxnSpPr>
+        <p:spPr>
+          <a:xfrm flipH="1">
+            <a:off x="3589132" y="1744393"/>
+            <a:ext cx="107929" cy="0"/>
+          </a:xfrm>
+          <a:prstGeom prst="line">
+            <a:avLst/>
+          </a:prstGeom>
+          <a:ln w="28575">
+            <a:solidFill>
+              <a:srgbClr val="7030A0"/>
+            </a:solidFill>
+          </a:ln>
+        </p:spPr>
+        <p:style>
+          <a:lnRef idx="3">
+            <a:schemeClr val="accent2"/>
+          </a:lnRef>
+          <a:fillRef idx="0">
+            <a:schemeClr val="accent2"/>
+          </a:fillRef>
+          <a:effectRef idx="2">
+            <a:schemeClr val="accent2"/>
+          </a:effectRef>
+          <a:fontRef idx="minor">
+            <a:schemeClr val="tx1"/>
+          </a:fontRef>
+        </p:style>
+      </p:cxnSp>
+      <p:cxnSp>
+        <p:nvCxnSpPr>
+          <p:cNvPr id="51" name="Straight Connector 50">
+            <a:extLst>
+              <a:ext uri="{FF2B5EF4-FFF2-40B4-BE49-F238E27FC236}">
+                <a16:creationId xmlns:a16="http://schemas.microsoft.com/office/drawing/2014/main" id="{C9299927-0C9C-CC06-FC01-696E1F0D8F59}"/>
+              </a:ext>
+            </a:extLst>
+          </p:cNvPr>
+          <p:cNvCxnSpPr>
+            <a:cxnSpLocks/>
+          </p:cNvCxnSpPr>
+          <p:nvPr/>
+        </p:nvCxnSpPr>
+        <p:spPr>
+          <a:xfrm flipH="1">
+            <a:off x="3457142" y="1808077"/>
+            <a:ext cx="107929" cy="0"/>
+          </a:xfrm>
+          <a:prstGeom prst="line">
+            <a:avLst/>
+          </a:prstGeom>
+          <a:ln w="28575">
+            <a:solidFill>
+              <a:srgbClr val="7030A0"/>
+            </a:solidFill>
+          </a:ln>
+        </p:spPr>
+        <p:style>
+          <a:lnRef idx="3">
+            <a:schemeClr val="accent2"/>
+          </a:lnRef>
+          <a:fillRef idx="0">
+            <a:schemeClr val="accent2"/>
+          </a:fillRef>
+          <a:effectRef idx="2">
+            <a:schemeClr val="accent2"/>
+          </a:effectRef>
+          <a:fontRef idx="minor">
+            <a:schemeClr val="tx1"/>
+          </a:fontRef>
+        </p:style>
+      </p:cxnSp>
     </p:spTree>
     <p:extLst>
       <p:ext uri="{BB962C8B-B14F-4D97-AF65-F5344CB8AC3E}">

</xml_diff>